<commit_message>
updated yolo with nav2
</commit_message>
<xml_diff>
--- a/Documentation/Images/07_Yolo/Yolo_nodes_topics.pptx
+++ b/Documentation/Images/07_Yolo/Yolo_nodes_topics.pptx
@@ -261,7 +261,7 @@
           <a:p>
             <a:fld id="{FE57838B-E04A-4FA0-B52C-9FF96CBE1B1C}" type="datetimeFigureOut">
               <a:rPr lang="en-GB" smtClean="0"/>
-              <a:t>25/11/2025</a:t>
+              <a:t>28/11/2025</a:t>
             </a:fld>
             <a:endParaRPr lang="en-GB"/>
           </a:p>
@@ -459,7 +459,7 @@
           <a:p>
             <a:fld id="{FE57838B-E04A-4FA0-B52C-9FF96CBE1B1C}" type="datetimeFigureOut">
               <a:rPr lang="en-GB" smtClean="0"/>
-              <a:t>25/11/2025</a:t>
+              <a:t>28/11/2025</a:t>
             </a:fld>
             <a:endParaRPr lang="en-GB"/>
           </a:p>
@@ -667,7 +667,7 @@
           <a:p>
             <a:fld id="{FE57838B-E04A-4FA0-B52C-9FF96CBE1B1C}" type="datetimeFigureOut">
               <a:rPr lang="en-GB" smtClean="0"/>
-              <a:t>25/11/2025</a:t>
+              <a:t>28/11/2025</a:t>
             </a:fld>
             <a:endParaRPr lang="en-GB"/>
           </a:p>
@@ -865,7 +865,7 @@
           <a:p>
             <a:fld id="{FE57838B-E04A-4FA0-B52C-9FF96CBE1B1C}" type="datetimeFigureOut">
               <a:rPr lang="en-GB" smtClean="0"/>
-              <a:t>25/11/2025</a:t>
+              <a:t>28/11/2025</a:t>
             </a:fld>
             <a:endParaRPr lang="en-GB"/>
           </a:p>
@@ -1140,7 +1140,7 @@
           <a:p>
             <a:fld id="{FE57838B-E04A-4FA0-B52C-9FF96CBE1B1C}" type="datetimeFigureOut">
               <a:rPr lang="en-GB" smtClean="0"/>
-              <a:t>25/11/2025</a:t>
+              <a:t>28/11/2025</a:t>
             </a:fld>
             <a:endParaRPr lang="en-GB"/>
           </a:p>
@@ -1405,7 +1405,7 @@
           <a:p>
             <a:fld id="{FE57838B-E04A-4FA0-B52C-9FF96CBE1B1C}" type="datetimeFigureOut">
               <a:rPr lang="en-GB" smtClean="0"/>
-              <a:t>25/11/2025</a:t>
+              <a:t>28/11/2025</a:t>
             </a:fld>
             <a:endParaRPr lang="en-GB"/>
           </a:p>
@@ -1817,7 +1817,7 @@
           <a:p>
             <a:fld id="{FE57838B-E04A-4FA0-B52C-9FF96CBE1B1C}" type="datetimeFigureOut">
               <a:rPr lang="en-GB" smtClean="0"/>
-              <a:t>25/11/2025</a:t>
+              <a:t>28/11/2025</a:t>
             </a:fld>
             <a:endParaRPr lang="en-GB"/>
           </a:p>
@@ -1958,7 +1958,7 @@
           <a:p>
             <a:fld id="{FE57838B-E04A-4FA0-B52C-9FF96CBE1B1C}" type="datetimeFigureOut">
               <a:rPr lang="en-GB" smtClean="0"/>
-              <a:t>25/11/2025</a:t>
+              <a:t>28/11/2025</a:t>
             </a:fld>
             <a:endParaRPr lang="en-GB"/>
           </a:p>
@@ -2071,7 +2071,7 @@
           <a:p>
             <a:fld id="{FE57838B-E04A-4FA0-B52C-9FF96CBE1B1C}" type="datetimeFigureOut">
               <a:rPr lang="en-GB" smtClean="0"/>
-              <a:t>25/11/2025</a:t>
+              <a:t>28/11/2025</a:t>
             </a:fld>
             <a:endParaRPr lang="en-GB"/>
           </a:p>
@@ -2382,7 +2382,7 @@
           <a:p>
             <a:fld id="{FE57838B-E04A-4FA0-B52C-9FF96CBE1B1C}" type="datetimeFigureOut">
               <a:rPr lang="en-GB" smtClean="0"/>
-              <a:t>25/11/2025</a:t>
+              <a:t>28/11/2025</a:t>
             </a:fld>
             <a:endParaRPr lang="en-GB"/>
           </a:p>
@@ -2670,7 +2670,7 @@
           <a:p>
             <a:fld id="{FE57838B-E04A-4FA0-B52C-9FF96CBE1B1C}" type="datetimeFigureOut">
               <a:rPr lang="en-GB" smtClean="0"/>
-              <a:t>25/11/2025</a:t>
+              <a:t>28/11/2025</a:t>
             </a:fld>
             <a:endParaRPr lang="en-GB"/>
           </a:p>
@@ -2911,7 +2911,7 @@
           <a:p>
             <a:fld id="{FE57838B-E04A-4FA0-B52C-9FF96CBE1B1C}" type="datetimeFigureOut">
               <a:rPr lang="en-GB" smtClean="0"/>
-              <a:t>25/11/2025</a:t>
+              <a:t>28/11/2025</a:t>
             </a:fld>
             <a:endParaRPr lang="en-GB"/>
           </a:p>
@@ -4139,8 +4139,8 @@
         </p:nvSpPr>
         <p:spPr>
           <a:xfrm>
-            <a:off x="486430" y="2105095"/>
-            <a:ext cx="2105063" cy="769441"/>
+            <a:off x="3972006" y="2105095"/>
+            <a:ext cx="1963999" cy="707886"/>
           </a:xfrm>
           <a:prstGeom prst="rect">
             <a:avLst/>
@@ -4154,22 +4154,37 @@
           <a:lstStyle/>
           <a:p>
             <a:r>
-              <a:rPr lang="es-ES" sz="1100" dirty="0"/>
+              <a:rPr lang="es-ES" sz="1000" dirty="0">
+                <a:latin typeface="Arial" panose="020B0604020202020204" pitchFamily="34" charset="0"/>
+                <a:cs typeface="Arial" panose="020B0604020202020204" pitchFamily="34" charset="0"/>
+              </a:rPr>
               <a:t>          /Yolov8_Inference</a:t>
             </a:r>
           </a:p>
           <a:p>
-            <a:endParaRPr lang="es-ES" sz="1100" dirty="0"/>
-          </a:p>
-          <a:p>
-            <a:endParaRPr lang="es-ES" sz="1100" dirty="0"/>
-          </a:p>
-          <a:p>
-            <a:r>
-              <a:rPr lang="es-ES" sz="1100" dirty="0"/>
+            <a:endParaRPr lang="es-ES" sz="1000" dirty="0">
+              <a:latin typeface="Arial" panose="020B0604020202020204" pitchFamily="34" charset="0"/>
+              <a:cs typeface="Arial" panose="020B0604020202020204" pitchFamily="34" charset="0"/>
+            </a:endParaRPr>
+          </a:p>
+          <a:p>
+            <a:endParaRPr lang="es-ES" sz="1000" dirty="0">
+              <a:latin typeface="Arial" panose="020B0604020202020204" pitchFamily="34" charset="0"/>
+              <a:cs typeface="Arial" panose="020B0604020202020204" pitchFamily="34" charset="0"/>
+            </a:endParaRPr>
+          </a:p>
+          <a:p>
+            <a:r>
+              <a:rPr lang="es-ES" sz="1000" dirty="0">
+                <a:latin typeface="Arial" panose="020B0604020202020204" pitchFamily="34" charset="0"/>
+                <a:cs typeface="Arial" panose="020B0604020202020204" pitchFamily="34" charset="0"/>
+              </a:rPr>
               <a:t>custom_msgs/ Yolov8Inference</a:t>
             </a:r>
-            <a:endParaRPr lang="en-GB" sz="1100" dirty="0"/>
+            <a:endParaRPr lang="en-GB" sz="1000" dirty="0">
+              <a:latin typeface="Arial" panose="020B0604020202020204" pitchFamily="34" charset="0"/>
+              <a:cs typeface="Arial" panose="020B0604020202020204" pitchFamily="34" charset="0"/>
+            </a:endParaRPr>
           </a:p>
         </p:txBody>
       </p:sp>
@@ -4202,7 +4217,7 @@
         </p:blipFill>
         <p:spPr bwMode="auto">
           <a:xfrm>
-            <a:off x="2228042" y="4113478"/>
+            <a:off x="5713618" y="4113478"/>
             <a:ext cx="1536873" cy="999388"/>
           </a:xfrm>
           <a:prstGeom prst="rect">
@@ -4249,7 +4264,7 @@
         </p:blipFill>
         <p:spPr bwMode="auto">
           <a:xfrm>
-            <a:off x="6873044" y="4116018"/>
+            <a:off x="10358620" y="4116018"/>
             <a:ext cx="1536873" cy="768326"/>
           </a:xfrm>
           <a:prstGeom prst="rect">
@@ -4281,7 +4296,7 @@
         </p:nvSpPr>
         <p:spPr>
           <a:xfrm>
-            <a:off x="2200179" y="2670774"/>
+            <a:off x="5685755" y="2670774"/>
             <a:ext cx="2219361" cy="1229174"/>
           </a:xfrm>
           <a:prstGeom prst="ellipse">
@@ -4333,7 +4348,7 @@
         </p:nvSpPr>
         <p:spPr>
           <a:xfrm>
-            <a:off x="2390118" y="3078298"/>
+            <a:off x="5875694" y="3078298"/>
             <a:ext cx="1966051" cy="369332"/>
           </a:xfrm>
           <a:prstGeom prst="rect">
@@ -4368,7 +4383,7 @@
         </p:nvSpPr>
         <p:spPr>
           <a:xfrm>
-            <a:off x="6338336" y="1140741"/>
+            <a:off x="9823912" y="1140741"/>
             <a:ext cx="1536874" cy="768327"/>
           </a:xfrm>
           <a:prstGeom prst="ellipse">
@@ -4420,7 +4435,7 @@
         </p:nvSpPr>
         <p:spPr>
           <a:xfrm>
-            <a:off x="6460842" y="1336230"/>
+            <a:off x="9946418" y="1336230"/>
             <a:ext cx="1213858" cy="369332"/>
           </a:xfrm>
           <a:prstGeom prst="rect">
@@ -4455,7 +4470,7 @@
         </p:nvSpPr>
         <p:spPr>
           <a:xfrm rot="20468949">
-            <a:off x="3254780" y="1727050"/>
+            <a:off x="6740356" y="1727050"/>
             <a:ext cx="4774181" cy="1294646"/>
           </a:xfrm>
           <a:prstGeom prst="arc">
@@ -4509,8 +4524,8 @@
         </p:nvSpPr>
         <p:spPr>
           <a:xfrm rot="20394311">
-            <a:off x="4339573" y="1458357"/>
-            <a:ext cx="1744645" cy="738664"/>
+            <a:off x="7914245" y="1504523"/>
+            <a:ext cx="1566454" cy="646331"/>
           </a:xfrm>
           <a:prstGeom prst="rect">
             <a:avLst/>
@@ -4524,19 +4539,31 @@
           <a:lstStyle/>
           <a:p>
             <a:r>
-              <a:rPr lang="es-ES" sz="1400" dirty="0"/>
+              <a:rPr lang="es-ES" sz="1200" dirty="0">
+                <a:latin typeface="Arial" panose="020B0604020202020204" pitchFamily="34" charset="0"/>
+                <a:cs typeface="Arial" panose="020B0604020202020204" pitchFamily="34" charset="0"/>
+              </a:rPr>
               <a:t>     /image_raw</a:t>
             </a:r>
           </a:p>
           <a:p>
-            <a:endParaRPr lang="es-ES" sz="1400" dirty="0"/>
-          </a:p>
-          <a:p>
-            <a:r>
-              <a:rPr lang="es-ES" sz="1400" dirty="0"/>
+            <a:endParaRPr lang="es-ES" sz="1200" dirty="0">
+              <a:latin typeface="Arial" panose="020B0604020202020204" pitchFamily="34" charset="0"/>
+              <a:cs typeface="Arial" panose="020B0604020202020204" pitchFamily="34" charset="0"/>
+            </a:endParaRPr>
+          </a:p>
+          <a:p>
+            <a:r>
+              <a:rPr lang="es-ES" sz="1200" dirty="0">
+                <a:latin typeface="Arial" panose="020B0604020202020204" pitchFamily="34" charset="0"/>
+                <a:cs typeface="Arial" panose="020B0604020202020204" pitchFamily="34" charset="0"/>
+              </a:rPr>
               <a:t>sensor_msgs/Image</a:t>
             </a:r>
-            <a:endParaRPr lang="en-GB" sz="1400" dirty="0"/>
+            <a:endParaRPr lang="en-GB" sz="1200" dirty="0">
+              <a:latin typeface="Arial" panose="020B0604020202020204" pitchFamily="34" charset="0"/>
+              <a:cs typeface="Arial" panose="020B0604020202020204" pitchFamily="34" charset="0"/>
+            </a:endParaRPr>
           </a:p>
         </p:txBody>
       </p:sp>
@@ -4554,7 +4581,7 @@
         </p:nvGrpSpPr>
         <p:grpSpPr>
           <a:xfrm>
-            <a:off x="5675090" y="2861823"/>
+            <a:off x="9160666" y="2861823"/>
             <a:ext cx="2783795" cy="819179"/>
             <a:chOff x="6299767" y="2807501"/>
             <a:chExt cx="2783795" cy="819179"/>
@@ -4663,7 +4690,7 @@
         </p:nvSpPr>
         <p:spPr>
           <a:xfrm>
-            <a:off x="3173661" y="3033679"/>
+            <a:off x="6659237" y="3033679"/>
             <a:ext cx="3933111" cy="1294646"/>
           </a:xfrm>
           <a:prstGeom prst="arc">
@@ -4717,8 +4744,8 @@
         </p:nvSpPr>
         <p:spPr>
           <a:xfrm>
-            <a:off x="4356169" y="3966598"/>
-            <a:ext cx="1800045" cy="738664"/>
+            <a:off x="7841745" y="3975651"/>
+            <a:ext cx="1601721" cy="646331"/>
           </a:xfrm>
           <a:prstGeom prst="rect">
             <a:avLst/>
@@ -4732,19 +4759,31 @@
           <a:lstStyle/>
           <a:p>
             <a:r>
-              <a:rPr lang="es-ES" sz="1400" dirty="0"/>
+              <a:rPr lang="es-ES" sz="1200" dirty="0">
+                <a:latin typeface="Arial" panose="020B0604020202020204" pitchFamily="34" charset="0"/>
+                <a:cs typeface="Arial" panose="020B0604020202020204" pitchFamily="34" charset="0"/>
+              </a:rPr>
               <a:t>          /odom</a:t>
             </a:r>
           </a:p>
           <a:p>
-            <a:endParaRPr lang="es-ES" sz="1400" dirty="0"/>
-          </a:p>
-          <a:p>
-            <a:r>
-              <a:rPr lang="es-ES" sz="1400" dirty="0"/>
+            <a:endParaRPr lang="es-ES" sz="1200" dirty="0">
+              <a:latin typeface="Arial" panose="020B0604020202020204" pitchFamily="34" charset="0"/>
+              <a:cs typeface="Arial" panose="020B0604020202020204" pitchFamily="34" charset="0"/>
+            </a:endParaRPr>
+          </a:p>
+          <a:p>
+            <a:r>
+              <a:rPr lang="es-ES" sz="1200" dirty="0">
+                <a:latin typeface="Arial" panose="020B0604020202020204" pitchFamily="34" charset="0"/>
+                <a:cs typeface="Arial" panose="020B0604020202020204" pitchFamily="34" charset="0"/>
+              </a:rPr>
               <a:t>nav_msgs/Odometry</a:t>
             </a:r>
-            <a:endParaRPr lang="en-GB" sz="1400" dirty="0"/>
+            <a:endParaRPr lang="en-GB" sz="1200" dirty="0">
+              <a:latin typeface="Arial" panose="020B0604020202020204" pitchFamily="34" charset="0"/>
+              <a:cs typeface="Arial" panose="020B0604020202020204" pitchFamily="34" charset="0"/>
+            </a:endParaRPr>
           </a:p>
         </p:txBody>
       </p:sp>
@@ -4762,7 +4801,7 @@
         </p:nvSpPr>
         <p:spPr>
           <a:xfrm>
-            <a:off x="-226337" y="2441773"/>
+            <a:off x="3259239" y="2441773"/>
             <a:ext cx="3098362" cy="1294646"/>
           </a:xfrm>
           <a:prstGeom prst="arc">
@@ -4816,8 +4855,8 @@
         </p:nvSpPr>
         <p:spPr>
           <a:xfrm>
-            <a:off x="776391" y="3499470"/>
-            <a:ext cx="1423788" cy="769441"/>
+            <a:off x="4261967" y="3499470"/>
+            <a:ext cx="1334020" cy="707886"/>
           </a:xfrm>
           <a:prstGeom prst="rect">
             <a:avLst/>
@@ -4831,22 +4870,37 @@
           <a:lstStyle/>
           <a:p>
             <a:r>
-              <a:rPr lang="es-ES" sz="1100" dirty="0"/>
+              <a:rPr lang="es-ES" sz="1000" dirty="0">
+                <a:latin typeface="Arial" panose="020B0604020202020204" pitchFamily="34" charset="0"/>
+                <a:cs typeface="Arial" panose="020B0604020202020204" pitchFamily="34" charset="0"/>
+              </a:rPr>
               <a:t>    /inference_result</a:t>
             </a:r>
           </a:p>
           <a:p>
-            <a:endParaRPr lang="es-ES" sz="1100" dirty="0"/>
-          </a:p>
-          <a:p>
-            <a:endParaRPr lang="es-ES" sz="1100" dirty="0"/>
-          </a:p>
-          <a:p>
-            <a:r>
-              <a:rPr lang="es-ES" sz="1100" dirty="0"/>
+            <a:endParaRPr lang="es-ES" sz="1000" dirty="0">
+              <a:latin typeface="Arial" panose="020B0604020202020204" pitchFamily="34" charset="0"/>
+              <a:cs typeface="Arial" panose="020B0604020202020204" pitchFamily="34" charset="0"/>
+            </a:endParaRPr>
+          </a:p>
+          <a:p>
+            <a:endParaRPr lang="es-ES" sz="1000" dirty="0">
+              <a:latin typeface="Arial" panose="020B0604020202020204" pitchFamily="34" charset="0"/>
+              <a:cs typeface="Arial" panose="020B0604020202020204" pitchFamily="34" charset="0"/>
+            </a:endParaRPr>
+          </a:p>
+          <a:p>
+            <a:r>
+              <a:rPr lang="es-ES" sz="1000" dirty="0">
+                <a:latin typeface="Arial" panose="020B0604020202020204" pitchFamily="34" charset="0"/>
+                <a:cs typeface="Arial" panose="020B0604020202020204" pitchFamily="34" charset="0"/>
+              </a:rPr>
               <a:t>sensor_msgs/Image</a:t>
             </a:r>
-            <a:endParaRPr lang="en-GB" sz="1100" dirty="0"/>
+            <a:endParaRPr lang="en-GB" sz="1000" dirty="0">
+              <a:latin typeface="Arial" panose="020B0604020202020204" pitchFamily="34" charset="0"/>
+              <a:cs typeface="Arial" panose="020B0604020202020204" pitchFamily="34" charset="0"/>
+            </a:endParaRPr>
           </a:p>
         </p:txBody>
       </p:sp>
@@ -4864,7 +4918,7 @@
         </p:nvSpPr>
         <p:spPr>
           <a:xfrm>
-            <a:off x="-73937" y="2594173"/>
+            <a:off x="3411639" y="2594173"/>
             <a:ext cx="3098362" cy="1294646"/>
           </a:xfrm>
           <a:prstGeom prst="arc">
@@ -4921,7 +4975,7 @@
         </p:nvCxnSpPr>
         <p:spPr>
           <a:xfrm flipV="1">
-            <a:off x="4419540" y="3271413"/>
+            <a:off x="7905116" y="3271413"/>
             <a:ext cx="1304516" cy="13948"/>
           </a:xfrm>
           <a:prstGeom prst="straightConnector1">
@@ -4963,8 +5017,8 @@
         </p:nvSpPr>
         <p:spPr>
           <a:xfrm>
-            <a:off x="4339368" y="2930268"/>
-            <a:ext cx="1510350" cy="769441"/>
+            <a:off x="7824944" y="2930268"/>
+            <a:ext cx="1555234" cy="769441"/>
           </a:xfrm>
           <a:prstGeom prst="rect">
             <a:avLst/>
@@ -4978,22 +5032,654 @@
           <a:lstStyle/>
           <a:p>
             <a:r>
-              <a:rPr lang="es-ES" sz="1100" dirty="0"/>
+              <a:rPr lang="es-ES" sz="1100" dirty="0">
+                <a:latin typeface="Arial" panose="020B0604020202020204" pitchFamily="34" charset="0"/>
+                <a:cs typeface="Arial" panose="020B0604020202020204" pitchFamily="34" charset="0"/>
+              </a:rPr>
               <a:t>          /cmd_vel</a:t>
             </a:r>
           </a:p>
           <a:p>
-            <a:endParaRPr lang="es-ES" sz="1100" dirty="0"/>
-          </a:p>
-          <a:p>
-            <a:endParaRPr lang="es-ES" sz="1100" dirty="0"/>
-          </a:p>
-          <a:p>
-            <a:r>
-              <a:rPr lang="es-ES" sz="1100" dirty="0"/>
+            <a:endParaRPr lang="es-ES" sz="1100" dirty="0">
+              <a:latin typeface="Arial" panose="020B0604020202020204" pitchFamily="34" charset="0"/>
+              <a:cs typeface="Arial" panose="020B0604020202020204" pitchFamily="34" charset="0"/>
+            </a:endParaRPr>
+          </a:p>
+          <a:p>
+            <a:endParaRPr lang="es-ES" sz="1100" dirty="0">
+              <a:latin typeface="Arial" panose="020B0604020202020204" pitchFamily="34" charset="0"/>
+              <a:cs typeface="Arial" panose="020B0604020202020204" pitchFamily="34" charset="0"/>
+            </a:endParaRPr>
+          </a:p>
+          <a:p>
+            <a:r>
+              <a:rPr lang="es-ES" sz="1100" dirty="0">
+                <a:latin typeface="Arial" panose="020B0604020202020204" pitchFamily="34" charset="0"/>
+                <a:cs typeface="Arial" panose="020B0604020202020204" pitchFamily="34" charset="0"/>
+              </a:rPr>
               <a:t>geometry_msgs/Twist</a:t>
             </a:r>
-            <a:endParaRPr lang="en-GB" sz="1100" dirty="0"/>
+            <a:endParaRPr lang="en-GB" sz="1100" dirty="0">
+              <a:latin typeface="Arial" panose="020B0604020202020204" pitchFamily="34" charset="0"/>
+              <a:cs typeface="Arial" panose="020B0604020202020204" pitchFamily="34" charset="0"/>
+            </a:endParaRPr>
+          </a:p>
+        </p:txBody>
+      </p:sp>
+      <p:sp>
+        <p:nvSpPr>
+          <p:cNvPr id="6" name="TextBox 5">
+            <a:extLst>
+              <a:ext uri="{FF2B5EF4-FFF2-40B4-BE49-F238E27FC236}">
+                <a16:creationId xmlns:a16="http://schemas.microsoft.com/office/drawing/2014/main" id="{BF6AE1A5-6858-B093-3E14-9D9EEE36D2EE}"/>
+              </a:ext>
+            </a:extLst>
+          </p:cNvPr>
+          <p:cNvSpPr txBox="1"/>
+          <p:nvPr/>
+        </p:nvSpPr>
+        <p:spPr>
+          <a:xfrm>
+            <a:off x="3911695" y="1139697"/>
+            <a:ext cx="1963999" cy="707886"/>
+          </a:xfrm>
+          <a:prstGeom prst="rect">
+            <a:avLst/>
+          </a:prstGeom>
+          <a:noFill/>
+        </p:spPr>
+        <p:txBody>
+          <a:bodyPr wrap="none" rtlCol="0">
+            <a:spAutoFit/>
+          </a:bodyPr>
+          <a:lstStyle/>
+          <a:p>
+            <a:r>
+              <a:rPr lang="es-ES" sz="1000" dirty="0">
+                <a:latin typeface="Arial" panose="020B0604020202020204" pitchFamily="34" charset="0"/>
+                <a:cs typeface="Arial" panose="020B0604020202020204" pitchFamily="34" charset="0"/>
+              </a:rPr>
+              <a:t>          </a:t>
+            </a:r>
+            <a:r>
+              <a:rPr lang="en-GB" sz="1000" dirty="0">
+                <a:latin typeface="Arial" panose="020B0604020202020204" pitchFamily="34" charset="0"/>
+                <a:cs typeface="Arial" panose="020B0604020202020204" pitchFamily="34" charset="0"/>
+              </a:rPr>
+              <a:t>/traffic_waypoint</a:t>
+            </a:r>
+            <a:endParaRPr lang="es-ES" sz="1000" dirty="0">
+              <a:latin typeface="Arial" panose="020B0604020202020204" pitchFamily="34" charset="0"/>
+              <a:cs typeface="Arial" panose="020B0604020202020204" pitchFamily="34" charset="0"/>
+            </a:endParaRPr>
+          </a:p>
+          <a:p>
+            <a:endParaRPr lang="es-ES" sz="1000" dirty="0">
+              <a:latin typeface="Arial" panose="020B0604020202020204" pitchFamily="34" charset="0"/>
+              <a:cs typeface="Arial" panose="020B0604020202020204" pitchFamily="34" charset="0"/>
+            </a:endParaRPr>
+          </a:p>
+          <a:p>
+            <a:endParaRPr lang="es-ES" sz="1000" dirty="0">
+              <a:latin typeface="Arial" panose="020B0604020202020204" pitchFamily="34" charset="0"/>
+              <a:cs typeface="Arial" panose="020B0604020202020204" pitchFamily="34" charset="0"/>
+            </a:endParaRPr>
+          </a:p>
+          <a:p>
+            <a:r>
+              <a:rPr lang="es-ES" sz="1000" dirty="0">
+                <a:latin typeface="Arial" panose="020B0604020202020204" pitchFamily="34" charset="0"/>
+                <a:cs typeface="Arial" panose="020B0604020202020204" pitchFamily="34" charset="0"/>
+              </a:rPr>
+              <a:t>geometry_msgs/ PoseStamped</a:t>
+            </a:r>
+            <a:endParaRPr lang="en-GB" sz="1000" dirty="0">
+              <a:latin typeface="Arial" panose="020B0604020202020204" pitchFamily="34" charset="0"/>
+              <a:cs typeface="Arial" panose="020B0604020202020204" pitchFamily="34" charset="0"/>
+            </a:endParaRPr>
+          </a:p>
+        </p:txBody>
+      </p:sp>
+      <p:sp>
+        <p:nvSpPr>
+          <p:cNvPr id="20" name="Arc 19">
+            <a:extLst>
+              <a:ext uri="{FF2B5EF4-FFF2-40B4-BE49-F238E27FC236}">
+                <a16:creationId xmlns:a16="http://schemas.microsoft.com/office/drawing/2014/main" id="{7368B210-77E9-8EA7-0385-E7082AD06B44}"/>
+              </a:ext>
+            </a:extLst>
+          </p:cNvPr>
+          <p:cNvSpPr/>
+          <p:nvPr/>
+        </p:nvSpPr>
+        <p:spPr>
+          <a:xfrm>
+            <a:off x="3333497" y="1405793"/>
+            <a:ext cx="3140211" cy="2510571"/>
+          </a:xfrm>
+          <a:prstGeom prst="arc">
+            <a:avLst>
+              <a:gd name="adj1" fmla="val 13192218"/>
+              <a:gd name="adj2" fmla="val 68"/>
+            </a:avLst>
+          </a:prstGeom>
+          <a:ln w="38100">
+            <a:solidFill>
+              <a:srgbClr val="FF0000"/>
+            </a:solidFill>
+            <a:headEnd type="triangle" w="med" len="med"/>
+            <a:tailEnd type="none" w="med" len="med"/>
+          </a:ln>
+        </p:spPr>
+        <p:style>
+          <a:lnRef idx="2">
+            <a:schemeClr val="accent1"/>
+          </a:lnRef>
+          <a:fillRef idx="0">
+            <a:schemeClr val="accent1"/>
+          </a:fillRef>
+          <a:effectRef idx="1">
+            <a:schemeClr val="accent1"/>
+          </a:effectRef>
+          <a:fontRef idx="minor">
+            <a:schemeClr val="tx1"/>
+          </a:fontRef>
+        </p:style>
+        <p:txBody>
+          <a:bodyPr rtlCol="0" anchor="ctr"/>
+          <a:lstStyle/>
+          <a:p>
+            <a:pPr algn="ctr"/>
+            <a:endParaRPr lang="en-GB"/>
+          </a:p>
+        </p:txBody>
+      </p:sp>
+      <p:sp>
+        <p:nvSpPr>
+          <p:cNvPr id="23" name="Oval 22">
+            <a:extLst>
+              <a:ext uri="{FF2B5EF4-FFF2-40B4-BE49-F238E27FC236}">
+                <a16:creationId xmlns:a16="http://schemas.microsoft.com/office/drawing/2014/main" id="{AC7D322B-4E39-0CE2-339E-2A375FE665C9}"/>
+              </a:ext>
+            </a:extLst>
+          </p:cNvPr>
+          <p:cNvSpPr/>
+          <p:nvPr/>
+        </p:nvSpPr>
+        <p:spPr>
+          <a:xfrm>
+            <a:off x="2226872" y="1493519"/>
+            <a:ext cx="1671461" cy="920709"/>
+          </a:xfrm>
+          <a:prstGeom prst="ellipse">
+            <a:avLst/>
+          </a:prstGeom>
+          <a:noFill/>
+          <a:ln w="57150">
+            <a:solidFill>
+              <a:srgbClr val="0070C0"/>
+            </a:solidFill>
+          </a:ln>
+        </p:spPr>
+        <p:style>
+          <a:lnRef idx="2">
+            <a:schemeClr val="accent1">
+              <a:shade val="15000"/>
+            </a:schemeClr>
+          </a:lnRef>
+          <a:fillRef idx="1">
+            <a:schemeClr val="accent1"/>
+          </a:fillRef>
+          <a:effectRef idx="0">
+            <a:schemeClr val="accent1"/>
+          </a:effectRef>
+          <a:fontRef idx="minor">
+            <a:schemeClr val="lt1"/>
+          </a:fontRef>
+        </p:style>
+        <p:txBody>
+          <a:bodyPr rtlCol="0" anchor="ctr"/>
+          <a:lstStyle/>
+          <a:p>
+            <a:pPr algn="ctr"/>
+            <a:endParaRPr lang="en-GB"/>
+          </a:p>
+        </p:txBody>
+      </p:sp>
+      <p:sp>
+        <p:nvSpPr>
+          <p:cNvPr id="24" name="TextBox 23">
+            <a:extLst>
+              <a:ext uri="{FF2B5EF4-FFF2-40B4-BE49-F238E27FC236}">
+                <a16:creationId xmlns:a16="http://schemas.microsoft.com/office/drawing/2014/main" id="{EED3F5C0-FF68-9902-346D-7D86C9A081EA}"/>
+              </a:ext>
+            </a:extLst>
+          </p:cNvPr>
+          <p:cNvSpPr txBox="1"/>
+          <p:nvPr/>
+        </p:nvSpPr>
+        <p:spPr>
+          <a:xfrm>
+            <a:off x="2241935" y="1757961"/>
+            <a:ext cx="1583447" cy="369332"/>
+          </a:xfrm>
+          <a:prstGeom prst="rect">
+            <a:avLst/>
+          </a:prstGeom>
+          <a:noFill/>
+        </p:spPr>
+        <p:txBody>
+          <a:bodyPr wrap="none" rtlCol="0">
+            <a:spAutoFit/>
+          </a:bodyPr>
+          <a:lstStyle/>
+          <a:p>
+            <a:r>
+              <a:rPr lang="en-GB" b="1" dirty="0"/>
+              <a:t>custom_nav2</a:t>
+            </a:r>
+          </a:p>
+        </p:txBody>
+      </p:sp>
+      <p:sp>
+        <p:nvSpPr>
+          <p:cNvPr id="25" name="TextBox 24">
+            <a:extLst>
+              <a:ext uri="{FF2B5EF4-FFF2-40B4-BE49-F238E27FC236}">
+                <a16:creationId xmlns:a16="http://schemas.microsoft.com/office/drawing/2014/main" id="{BA1E3A49-E08F-365A-BA08-7ECE4591AA21}"/>
+              </a:ext>
+            </a:extLst>
+          </p:cNvPr>
+          <p:cNvSpPr txBox="1"/>
+          <p:nvPr/>
+        </p:nvSpPr>
+        <p:spPr>
+          <a:xfrm>
+            <a:off x="1536980" y="1091464"/>
+            <a:ext cx="1476383" cy="646331"/>
+          </a:xfrm>
+          <a:prstGeom prst="rect">
+            <a:avLst/>
+          </a:prstGeom>
+          <a:noFill/>
+        </p:spPr>
+        <p:txBody>
+          <a:bodyPr wrap="square" rtlCol="0">
+            <a:spAutoFit/>
+          </a:bodyPr>
+          <a:lstStyle/>
+          <a:p>
+            <a:r>
+              <a:rPr lang="en-GB" sz="900" dirty="0">
+                <a:latin typeface="Arial" panose="020B0604020202020204" pitchFamily="34" charset="0"/>
+                <a:cs typeface="Arial" panose="020B0604020202020204" pitchFamily="34" charset="0"/>
+              </a:rPr>
+              <a:t> /navigate_to_pose</a:t>
+            </a:r>
+            <a:endParaRPr lang="es-ES" sz="900" dirty="0">
+              <a:latin typeface="Arial" panose="020B0604020202020204" pitchFamily="34" charset="0"/>
+              <a:cs typeface="Arial" panose="020B0604020202020204" pitchFamily="34" charset="0"/>
+            </a:endParaRPr>
+          </a:p>
+          <a:p>
+            <a:endParaRPr lang="es-ES" sz="900" dirty="0">
+              <a:latin typeface="Arial" panose="020B0604020202020204" pitchFamily="34" charset="0"/>
+              <a:cs typeface="Arial" panose="020B0604020202020204" pitchFamily="34" charset="0"/>
+            </a:endParaRPr>
+          </a:p>
+          <a:p>
+            <a:r>
+              <a:rPr lang="es-ES" sz="900" dirty="0">
+                <a:latin typeface="Arial" panose="020B0604020202020204" pitchFamily="34" charset="0"/>
+                <a:cs typeface="Arial" panose="020B0604020202020204" pitchFamily="34" charset="0"/>
+              </a:rPr>
+              <a:t>geometry_msgs/ PoseStamped</a:t>
+            </a:r>
+            <a:endParaRPr lang="en-GB" sz="900" dirty="0">
+              <a:latin typeface="Arial" panose="020B0604020202020204" pitchFamily="34" charset="0"/>
+              <a:cs typeface="Arial" panose="020B0604020202020204" pitchFamily="34" charset="0"/>
+            </a:endParaRPr>
+          </a:p>
+        </p:txBody>
+      </p:sp>
+      <p:sp>
+        <p:nvSpPr>
+          <p:cNvPr id="26" name="Arc 25">
+            <a:extLst>
+              <a:ext uri="{FF2B5EF4-FFF2-40B4-BE49-F238E27FC236}">
+                <a16:creationId xmlns:a16="http://schemas.microsoft.com/office/drawing/2014/main" id="{7AF586F3-3255-03FE-3D13-EABCBE7C349B}"/>
+              </a:ext>
+            </a:extLst>
+          </p:cNvPr>
+          <p:cNvSpPr/>
+          <p:nvPr/>
+        </p:nvSpPr>
+        <p:spPr>
+          <a:xfrm>
+            <a:off x="1151359" y="1299527"/>
+            <a:ext cx="1583447" cy="805568"/>
+          </a:xfrm>
+          <a:prstGeom prst="arc">
+            <a:avLst>
+              <a:gd name="adj1" fmla="val 12008760"/>
+              <a:gd name="adj2" fmla="val 20720397"/>
+            </a:avLst>
+          </a:prstGeom>
+          <a:ln w="38100">
+            <a:solidFill>
+              <a:srgbClr val="FF0000"/>
+            </a:solidFill>
+            <a:headEnd type="triangle" w="med" len="med"/>
+            <a:tailEnd type="none" w="med" len="med"/>
+          </a:ln>
+        </p:spPr>
+        <p:style>
+          <a:lnRef idx="2">
+            <a:schemeClr val="accent1"/>
+          </a:lnRef>
+          <a:fillRef idx="0">
+            <a:schemeClr val="accent1"/>
+          </a:fillRef>
+          <a:effectRef idx="1">
+            <a:schemeClr val="accent1"/>
+          </a:effectRef>
+          <a:fontRef idx="minor">
+            <a:schemeClr val="tx1"/>
+          </a:fontRef>
+        </p:style>
+        <p:txBody>
+          <a:bodyPr rtlCol="0" anchor="ctr"/>
+          <a:lstStyle/>
+          <a:p>
+            <a:pPr algn="ctr"/>
+            <a:endParaRPr lang="en-GB"/>
+          </a:p>
+        </p:txBody>
+      </p:sp>
+      <p:sp>
+        <p:nvSpPr>
+          <p:cNvPr id="27" name="Oval 26">
+            <a:extLst>
+              <a:ext uri="{FF2B5EF4-FFF2-40B4-BE49-F238E27FC236}">
+                <a16:creationId xmlns:a16="http://schemas.microsoft.com/office/drawing/2014/main" id="{54813074-8FD4-7F7A-5381-47493327AFD7}"/>
+              </a:ext>
+            </a:extLst>
+          </p:cNvPr>
+          <p:cNvSpPr/>
+          <p:nvPr/>
+        </p:nvSpPr>
+        <p:spPr>
+          <a:xfrm>
+            <a:off x="271604" y="1405794"/>
+            <a:ext cx="1220721" cy="725874"/>
+          </a:xfrm>
+          <a:prstGeom prst="ellipse">
+            <a:avLst/>
+          </a:prstGeom>
+          <a:noFill/>
+          <a:ln w="57150">
+            <a:solidFill>
+              <a:srgbClr val="0070C0"/>
+            </a:solidFill>
+          </a:ln>
+        </p:spPr>
+        <p:style>
+          <a:lnRef idx="2">
+            <a:schemeClr val="accent1">
+              <a:shade val="15000"/>
+            </a:schemeClr>
+          </a:lnRef>
+          <a:fillRef idx="1">
+            <a:schemeClr val="accent1"/>
+          </a:fillRef>
+          <a:effectRef idx="0">
+            <a:schemeClr val="accent1"/>
+          </a:effectRef>
+          <a:fontRef idx="minor">
+            <a:schemeClr val="lt1"/>
+          </a:fontRef>
+        </p:style>
+        <p:txBody>
+          <a:bodyPr rtlCol="0" anchor="ctr"/>
+          <a:lstStyle/>
+          <a:p>
+            <a:pPr algn="ctr"/>
+            <a:endParaRPr lang="en-GB"/>
+          </a:p>
+        </p:txBody>
+      </p:sp>
+      <p:sp>
+        <p:nvSpPr>
+          <p:cNvPr id="28" name="TextBox 27">
+            <a:extLst>
+              <a:ext uri="{FF2B5EF4-FFF2-40B4-BE49-F238E27FC236}">
+                <a16:creationId xmlns:a16="http://schemas.microsoft.com/office/drawing/2014/main" id="{59F4A090-FE22-EC9D-209C-A781278F6111}"/>
+              </a:ext>
+            </a:extLst>
+          </p:cNvPr>
+          <p:cNvSpPr txBox="1"/>
+          <p:nvPr/>
+        </p:nvSpPr>
+        <p:spPr>
+          <a:xfrm>
+            <a:off x="291535" y="1589571"/>
+            <a:ext cx="1173142" cy="307777"/>
+          </a:xfrm>
+          <a:prstGeom prst="rect">
+            <a:avLst/>
+          </a:prstGeom>
+          <a:noFill/>
+        </p:spPr>
+        <p:txBody>
+          <a:bodyPr wrap="none" rtlCol="0">
+            <a:spAutoFit/>
+          </a:bodyPr>
+          <a:lstStyle/>
+          <a:p>
+            <a:r>
+              <a:rPr lang="en-GB" sz="1400" b="1" dirty="0"/>
+              <a:t>bt-navigator</a:t>
+            </a:r>
+          </a:p>
+        </p:txBody>
+      </p:sp>
+      <p:sp>
+        <p:nvSpPr>
+          <p:cNvPr id="29" name="TextBox 28">
+            <a:extLst>
+              <a:ext uri="{FF2B5EF4-FFF2-40B4-BE49-F238E27FC236}">
+                <a16:creationId xmlns:a16="http://schemas.microsoft.com/office/drawing/2014/main" id="{BDB47430-2E95-4315-ACBD-C0D81418FE6E}"/>
+              </a:ext>
+            </a:extLst>
+          </p:cNvPr>
+          <p:cNvSpPr txBox="1"/>
+          <p:nvPr/>
+        </p:nvSpPr>
+        <p:spPr>
+          <a:xfrm>
+            <a:off x="219359" y="3314988"/>
+            <a:ext cx="1239891" cy="338554"/>
+          </a:xfrm>
+          <a:prstGeom prst="rect">
+            <a:avLst/>
+          </a:prstGeom>
+          <a:noFill/>
+        </p:spPr>
+        <p:txBody>
+          <a:bodyPr wrap="none" rtlCol="0">
+            <a:spAutoFit/>
+          </a:bodyPr>
+          <a:lstStyle/>
+          <a:p>
+            <a:r>
+              <a:rPr lang="en-GB" sz="1600" b="1" dirty="0"/>
+              <a:t>Nav2-stack</a:t>
+            </a:r>
+          </a:p>
+        </p:txBody>
+      </p:sp>
+      <p:sp>
+        <p:nvSpPr>
+          <p:cNvPr id="30" name="Rectangle 29">
+            <a:extLst>
+              <a:ext uri="{FF2B5EF4-FFF2-40B4-BE49-F238E27FC236}">
+                <a16:creationId xmlns:a16="http://schemas.microsoft.com/office/drawing/2014/main" id="{7F3F3203-DD05-F45A-505E-CE9E9CCA64F9}"/>
+              </a:ext>
+            </a:extLst>
+          </p:cNvPr>
+          <p:cNvSpPr/>
+          <p:nvPr/>
+        </p:nvSpPr>
+        <p:spPr>
+          <a:xfrm>
+            <a:off x="154734" y="1082627"/>
+            <a:ext cx="1444918" cy="2188786"/>
+          </a:xfrm>
+          <a:prstGeom prst="rect">
+            <a:avLst/>
+          </a:prstGeom>
+          <a:noFill/>
+          <a:ln>
+            <a:prstDash val="dash"/>
+          </a:ln>
+        </p:spPr>
+        <p:style>
+          <a:lnRef idx="2">
+            <a:schemeClr val="accent1">
+              <a:shade val="15000"/>
+            </a:schemeClr>
+          </a:lnRef>
+          <a:fillRef idx="1">
+            <a:schemeClr val="accent1"/>
+          </a:fillRef>
+          <a:effectRef idx="0">
+            <a:schemeClr val="accent1"/>
+          </a:effectRef>
+          <a:fontRef idx="minor">
+            <a:schemeClr val="lt1"/>
+          </a:fontRef>
+        </p:style>
+        <p:txBody>
+          <a:bodyPr rtlCol="0" anchor="ctr"/>
+          <a:lstStyle/>
+          <a:p>
+            <a:pPr algn="ctr"/>
+            <a:endParaRPr lang="en-GB"/>
+          </a:p>
+        </p:txBody>
+      </p:sp>
+      <p:sp>
+        <p:nvSpPr>
+          <p:cNvPr id="31" name="TextBox 30">
+            <a:extLst>
+              <a:ext uri="{FF2B5EF4-FFF2-40B4-BE49-F238E27FC236}">
+                <a16:creationId xmlns:a16="http://schemas.microsoft.com/office/drawing/2014/main" id="{8E88450D-594D-95BD-8E49-AD02E4EFA83E}"/>
+              </a:ext>
+            </a:extLst>
+          </p:cNvPr>
+          <p:cNvSpPr txBox="1"/>
+          <p:nvPr/>
+        </p:nvSpPr>
+        <p:spPr>
+          <a:xfrm>
+            <a:off x="1543484" y="2395546"/>
+            <a:ext cx="1476383" cy="646331"/>
+          </a:xfrm>
+          <a:prstGeom prst="rect">
+            <a:avLst/>
+          </a:prstGeom>
+          <a:noFill/>
+        </p:spPr>
+        <p:txBody>
+          <a:bodyPr wrap="square" rtlCol="0">
+            <a:spAutoFit/>
+          </a:bodyPr>
+          <a:lstStyle/>
+          <a:p>
+            <a:r>
+              <a:rPr lang="en-GB" sz="900" dirty="0">
+                <a:latin typeface="Arial" panose="020B0604020202020204" pitchFamily="34" charset="0"/>
+                <a:cs typeface="Arial" panose="020B0604020202020204" pitchFamily="34" charset="0"/>
+              </a:rPr>
+              <a:t> /initialpose</a:t>
+            </a:r>
+            <a:endParaRPr lang="es-ES" sz="900" dirty="0">
+              <a:latin typeface="Arial" panose="020B0604020202020204" pitchFamily="34" charset="0"/>
+              <a:cs typeface="Arial" panose="020B0604020202020204" pitchFamily="34" charset="0"/>
+            </a:endParaRPr>
+          </a:p>
+          <a:p>
+            <a:endParaRPr lang="es-ES" sz="900" dirty="0">
+              <a:latin typeface="Arial" panose="020B0604020202020204" pitchFamily="34" charset="0"/>
+              <a:cs typeface="Arial" panose="020B0604020202020204" pitchFamily="34" charset="0"/>
+            </a:endParaRPr>
+          </a:p>
+          <a:p>
+            <a:r>
+              <a:rPr lang="es-ES" sz="900" dirty="0">
+                <a:latin typeface="Arial" panose="020B0604020202020204" pitchFamily="34" charset="0"/>
+                <a:cs typeface="Arial" panose="020B0604020202020204" pitchFamily="34" charset="0"/>
+              </a:rPr>
+              <a:t>geometry_msgs/ PoseStamped</a:t>
+            </a:r>
+            <a:endParaRPr lang="en-GB" sz="900" dirty="0">
+              <a:latin typeface="Arial" panose="020B0604020202020204" pitchFamily="34" charset="0"/>
+              <a:cs typeface="Arial" panose="020B0604020202020204" pitchFamily="34" charset="0"/>
+            </a:endParaRPr>
+          </a:p>
+        </p:txBody>
+      </p:sp>
+      <p:sp>
+        <p:nvSpPr>
+          <p:cNvPr id="32" name="Arc 31">
+            <a:extLst>
+              <a:ext uri="{FF2B5EF4-FFF2-40B4-BE49-F238E27FC236}">
+                <a16:creationId xmlns:a16="http://schemas.microsoft.com/office/drawing/2014/main" id="{8C1CA9F2-CF51-1444-8C86-2CB28BBCB852}"/>
+              </a:ext>
+            </a:extLst>
+          </p:cNvPr>
+          <p:cNvSpPr/>
+          <p:nvPr/>
+        </p:nvSpPr>
+        <p:spPr>
+          <a:xfrm>
+            <a:off x="1023487" y="1856878"/>
+            <a:ext cx="1583447" cy="805568"/>
+          </a:xfrm>
+          <a:prstGeom prst="arc">
+            <a:avLst>
+              <a:gd name="adj1" fmla="val 412635"/>
+              <a:gd name="adj2" fmla="val 9187408"/>
+            </a:avLst>
+          </a:prstGeom>
+          <a:ln w="38100">
+            <a:solidFill>
+              <a:srgbClr val="FF0000"/>
+            </a:solidFill>
+            <a:headEnd type="none" w="med" len="med"/>
+            <a:tailEnd type="triangle" w="med" len="med"/>
+          </a:ln>
+        </p:spPr>
+        <p:style>
+          <a:lnRef idx="2">
+            <a:schemeClr val="accent1"/>
+          </a:lnRef>
+          <a:fillRef idx="0">
+            <a:schemeClr val="accent1"/>
+          </a:fillRef>
+          <a:effectRef idx="1">
+            <a:schemeClr val="accent1"/>
+          </a:effectRef>
+          <a:fontRef idx="minor">
+            <a:schemeClr val="tx1"/>
+          </a:fontRef>
+        </p:style>
+        <p:txBody>
+          <a:bodyPr rtlCol="0" anchor="ctr"/>
+          <a:lstStyle/>
+          <a:p>
+            <a:pPr algn="ctr"/>
+            <a:endParaRPr lang="en-GB"/>
           </a:p>
         </p:txBody>
       </p:sp>

</xml_diff>